<commit_message>
added pipeline info to pptx
</commit_message>
<xml_diff>
--- a/docs/20240105-test_ice_sample_resuts.pptx
+++ b/docs/20240105-test_ice_sample_resuts.pptx
@@ -5,15 +5,16 @@
     <p:sldMasterId id="2147483660" r:id="rId1"/>
   </p:sldMasterIdLst>
   <p:notesMasterIdLst>
-    <p:notesMasterId r:id="rId8"/>
+    <p:notesMasterId r:id="rId9"/>
   </p:notesMasterIdLst>
   <p:sldIdLst>
     <p:sldId id="256" r:id="rId2"/>
-    <p:sldId id="257" r:id="rId3"/>
-    <p:sldId id="260" r:id="rId4"/>
-    <p:sldId id="261" r:id="rId5"/>
-    <p:sldId id="258" r:id="rId6"/>
-    <p:sldId id="259" r:id="rId7"/>
+    <p:sldId id="262" r:id="rId3"/>
+    <p:sldId id="257" r:id="rId4"/>
+    <p:sldId id="260" r:id="rId5"/>
+    <p:sldId id="261" r:id="rId6"/>
+    <p:sldId id="258" r:id="rId7"/>
+    <p:sldId id="259" r:id="rId8"/>
   </p:sldIdLst>
   <p:sldSz cx="12192000" cy="6858000"/>
   <p:notesSz cx="6858000" cy="9144000"/>
@@ -112,6 +113,11 @@
       </a:defRPr>
     </a:lvl9pPr>
   </p:defaultTextStyle>
+  <p:extLst>
+    <p:ext uri="{EFAFB233-063F-42B5-8137-9DF3F51BA10A}">
+      <p15:sldGuideLst xmlns:p15="http://schemas.microsoft.com/office/powerpoint/2012/main"/>
+    </p:ext>
+  </p:extLst>
 </p:presentation>
 </file>
 
@@ -532,7 +538,7 @@
           <a:p>
             <a:fld id="{F4656947-5F20-0441-8B93-7EBA5C2CE4DD}" type="slidenum">
               <a:rPr lang="en-US" smtClean="0"/>
-              <a:t>3</a:t>
+              <a:t>4</a:t>
             </a:fld>
             <a:endParaRPr lang="en-US"/>
           </a:p>
@@ -628,7 +634,7 @@
           <a:p>
             <a:fld id="{F4656947-5F20-0441-8B93-7EBA5C2CE4DD}" type="slidenum">
               <a:rPr lang="en-US" smtClean="0"/>
-              <a:t>4</a:t>
+              <a:t>5</a:t>
             </a:fld>
             <a:endParaRPr lang="en-US"/>
           </a:p>
@@ -712,7 +718,7 @@
           <a:p>
             <a:fld id="{F4656947-5F20-0441-8B93-7EBA5C2CE4DD}" type="slidenum">
               <a:rPr lang="en-US" smtClean="0"/>
-              <a:t>6</a:t>
+              <a:t>7</a:t>
             </a:fld>
             <a:endParaRPr lang="en-US"/>
           </a:p>
@@ -4274,6 +4280,136 @@
           <p:cNvPr id="2" name="Title 1">
             <a:extLst>
               <a:ext uri="{FF2B5EF4-FFF2-40B4-BE49-F238E27FC236}">
+                <a16:creationId xmlns:a16="http://schemas.microsoft.com/office/drawing/2014/main" id="{FCAC80FB-1445-166B-8372-D5F5FC0AD364}"/>
+              </a:ext>
+            </a:extLst>
+          </p:cNvPr>
+          <p:cNvSpPr>
+            <a:spLocks noGrp="1"/>
+          </p:cNvSpPr>
+          <p:nvPr>
+            <p:ph type="title"/>
+          </p:nvPr>
+        </p:nvSpPr>
+        <p:spPr/>
+        <p:txBody>
+          <a:bodyPr/>
+          <a:lstStyle/>
+          <a:p>
+            <a:r>
+              <a:rPr lang="en-US" dirty="0"/>
+              <a:t>Processing pipeline</a:t>
+            </a:r>
+          </a:p>
+        </p:txBody>
+      </p:sp>
+      <p:sp>
+        <p:nvSpPr>
+          <p:cNvPr id="3" name="Content Placeholder 2">
+            <a:extLst>
+              <a:ext uri="{FF2B5EF4-FFF2-40B4-BE49-F238E27FC236}">
+                <a16:creationId xmlns:a16="http://schemas.microsoft.com/office/drawing/2014/main" id="{1E220EA7-37BE-3E8F-1698-DE6441306190}"/>
+              </a:ext>
+            </a:extLst>
+          </p:cNvPr>
+          <p:cNvSpPr>
+            <a:spLocks noGrp="1"/>
+          </p:cNvSpPr>
+          <p:nvPr>
+            <p:ph idx="1"/>
+          </p:nvPr>
+        </p:nvSpPr>
+        <p:spPr>
+          <a:xfrm>
+            <a:off x="838200" y="1948543"/>
+            <a:ext cx="10515600" cy="4228420"/>
+          </a:xfrm>
+        </p:spPr>
+        <p:txBody>
+          <a:bodyPr/>
+          <a:lstStyle/>
+          <a:p>
+            <a:r>
+              <a:rPr lang="en-US" dirty="0"/>
+              <a:t>Shotgun whole metagenome DNA sequencing on </a:t>
+            </a:r>
+            <a:r>
+              <a:rPr lang="en-US" dirty="0" err="1"/>
+              <a:t>MiSeq</a:t>
+            </a:r>
+            <a:r>
+              <a:rPr lang="en-US" dirty="0"/>
+              <a:t> (paired end 150-bp reads)</a:t>
+            </a:r>
+          </a:p>
+          <a:p>
+            <a:r>
+              <a:rPr lang="en-US" dirty="0"/>
+              <a:t>Adapter trimming, and filtered for quality and read length with </a:t>
+            </a:r>
+            <a:r>
+              <a:rPr lang="en-US" dirty="0" err="1"/>
+              <a:t>fastp</a:t>
+            </a:r>
+            <a:endParaRPr lang="en-US" dirty="0"/>
+          </a:p>
+          <a:p>
+            <a:r>
+              <a:rPr lang="en-US" dirty="0"/>
+              <a:t>Taxonomic profiling with Kraken2 using standard </a:t>
+            </a:r>
+            <a:r>
+              <a:rPr lang="en-US" dirty="0" err="1"/>
+              <a:t>RefSeq</a:t>
+            </a:r>
+            <a:r>
+              <a:rPr lang="en-US" dirty="0"/>
+              <a:t> library (includes archaea, bacteria, viruses, human, plasmids)</a:t>
+            </a:r>
+          </a:p>
+          <a:p>
+            <a:endParaRPr lang="en-US" dirty="0"/>
+          </a:p>
+          <a:p>
+            <a:endParaRPr lang="en-US" dirty="0"/>
+          </a:p>
+        </p:txBody>
+      </p:sp>
+    </p:spTree>
+    <p:extLst>
+      <p:ext uri="{BB962C8B-B14F-4D97-AF65-F5344CB8AC3E}">
+        <p14:creationId xmlns:p14="http://schemas.microsoft.com/office/powerpoint/2010/main" val="3586187100"/>
+      </p:ext>
+    </p:extLst>
+  </p:cSld>
+  <p:clrMapOvr>
+    <a:masterClrMapping/>
+  </p:clrMapOvr>
+</p:sld>
+</file>
+
+<file path=ppt/slides/slide3.xml><?xml version="1.0" encoding="utf-8"?>
+<p:sld xmlns:a="http://schemas.openxmlformats.org/drawingml/2006/main" xmlns:r="http://schemas.openxmlformats.org/officeDocument/2006/relationships" xmlns:p="http://schemas.openxmlformats.org/presentationml/2006/main">
+  <p:cSld>
+    <p:spTree>
+      <p:nvGrpSpPr>
+        <p:cNvPr id="1" name=""/>
+        <p:cNvGrpSpPr/>
+        <p:nvPr/>
+      </p:nvGrpSpPr>
+      <p:grpSpPr>
+        <a:xfrm>
+          <a:off x="0" y="0"/>
+          <a:ext cx="0" cy="0"/>
+          <a:chOff x="0" y="0"/>
+          <a:chExt cx="0" cy="0"/>
+        </a:xfrm>
+      </p:grpSpPr>
+      <p:sp>
+        <p:nvSpPr>
+          <p:cNvPr id="2" name="Title 1">
+            <a:extLst>
+              <a:ext uri="{FF2B5EF4-FFF2-40B4-BE49-F238E27FC236}">
                 <a16:creationId xmlns:a16="http://schemas.microsoft.com/office/drawing/2014/main" id="{08784384-8BB7-8F06-6548-6F77ECB01022}"/>
               </a:ext>
             </a:extLst>
@@ -4406,7 +4542,7 @@
 </p:sld>
 </file>
 
-<file path=ppt/slides/slide3.xml><?xml version="1.0" encoding="utf-8"?>
+<file path=ppt/slides/slide4.xml><?xml version="1.0" encoding="utf-8"?>
 <p:sld xmlns:a="http://schemas.openxmlformats.org/drawingml/2006/main" xmlns:r="http://schemas.openxmlformats.org/officeDocument/2006/relationships" xmlns:p="http://schemas.openxmlformats.org/presentationml/2006/main">
   <p:cSld>
     <p:spTree>
@@ -4706,7 +4842,7 @@
 </p:sld>
 </file>
 
-<file path=ppt/slides/slide4.xml><?xml version="1.0" encoding="utf-8"?>
+<file path=ppt/slides/slide5.xml><?xml version="1.0" encoding="utf-8"?>
 <p:sld xmlns:a="http://schemas.openxmlformats.org/drawingml/2006/main" xmlns:r="http://schemas.openxmlformats.org/officeDocument/2006/relationships" xmlns:p="http://schemas.openxmlformats.org/presentationml/2006/main">
   <p:cSld>
     <p:spTree>
@@ -4986,7 +5122,7 @@
 </p:sld>
 </file>
 
-<file path=ppt/slides/slide5.xml><?xml version="1.0" encoding="utf-8"?>
+<file path=ppt/slides/slide6.xml><?xml version="1.0" encoding="utf-8"?>
 <p:sld xmlns:a="http://schemas.openxmlformats.org/drawingml/2006/main" xmlns:r="http://schemas.openxmlformats.org/officeDocument/2006/relationships" xmlns:p="http://schemas.openxmlformats.org/presentationml/2006/main">
   <p:cSld>
     <p:spTree>
@@ -5178,7 +5314,7 @@
 </p:sld>
 </file>
 
-<file path=ppt/slides/slide6.xml><?xml version="1.0" encoding="utf-8"?>
+<file path=ppt/slides/slide7.xml><?xml version="1.0" encoding="utf-8"?>
 <p:sld xmlns:a="http://schemas.openxmlformats.org/drawingml/2006/main" xmlns:r="http://schemas.openxmlformats.org/officeDocument/2006/relationships" xmlns:p="http://schemas.openxmlformats.org/presentationml/2006/main">
   <p:cSld>
     <p:spTree>

</xml_diff>